<commit_message>
cambios de la memoria
</commit_message>
<xml_diff>
--- a/DOCUMENTOS/pruebas.pptx
+++ b/DOCUMENTOS/pruebas.pptx
@@ -10,6 +10,7 @@
     <p:sldId id="258" r:id="rId4"/>
     <p:sldId id="259" r:id="rId5"/>
     <p:sldId id="260" r:id="rId6"/>
+    <p:sldId id="261" r:id="rId7"/>
   </p:sldIdLst>
   <p:sldSz cx="12192000" cy="6858000"/>
   <p:notesSz cx="6858000" cy="9144000"/>
@@ -263,7 +264,7 @@
           <a:p>
             <a:fld id="{EDAEA687-FD54-4C1E-B5BE-4D2DA1082E4F}" type="datetimeFigureOut">
               <a:rPr lang="es-ES" smtClean="0"/>
-              <a:t>14/05/2018</a:t>
+              <a:t>17/05/2018</a:t>
             </a:fld>
             <a:endParaRPr lang="es-ES"/>
           </a:p>
@@ -461,7 +462,7 @@
           <a:p>
             <a:fld id="{EDAEA687-FD54-4C1E-B5BE-4D2DA1082E4F}" type="datetimeFigureOut">
               <a:rPr lang="es-ES" smtClean="0"/>
-              <a:t>14/05/2018</a:t>
+              <a:t>17/05/2018</a:t>
             </a:fld>
             <a:endParaRPr lang="es-ES"/>
           </a:p>
@@ -669,7 +670,7 @@
           <a:p>
             <a:fld id="{EDAEA687-FD54-4C1E-B5BE-4D2DA1082E4F}" type="datetimeFigureOut">
               <a:rPr lang="es-ES" smtClean="0"/>
-              <a:t>14/05/2018</a:t>
+              <a:t>17/05/2018</a:t>
             </a:fld>
             <a:endParaRPr lang="es-ES"/>
           </a:p>
@@ -867,7 +868,7 @@
           <a:p>
             <a:fld id="{EDAEA687-FD54-4C1E-B5BE-4D2DA1082E4F}" type="datetimeFigureOut">
               <a:rPr lang="es-ES" smtClean="0"/>
-              <a:t>14/05/2018</a:t>
+              <a:t>17/05/2018</a:t>
             </a:fld>
             <a:endParaRPr lang="es-ES"/>
           </a:p>
@@ -1142,7 +1143,7 @@
           <a:p>
             <a:fld id="{EDAEA687-FD54-4C1E-B5BE-4D2DA1082E4F}" type="datetimeFigureOut">
               <a:rPr lang="es-ES" smtClean="0"/>
-              <a:t>14/05/2018</a:t>
+              <a:t>17/05/2018</a:t>
             </a:fld>
             <a:endParaRPr lang="es-ES"/>
           </a:p>
@@ -1407,7 +1408,7 @@
           <a:p>
             <a:fld id="{EDAEA687-FD54-4C1E-B5BE-4D2DA1082E4F}" type="datetimeFigureOut">
               <a:rPr lang="es-ES" smtClean="0"/>
-              <a:t>14/05/2018</a:t>
+              <a:t>17/05/2018</a:t>
             </a:fld>
             <a:endParaRPr lang="es-ES"/>
           </a:p>
@@ -1819,7 +1820,7 @@
           <a:p>
             <a:fld id="{EDAEA687-FD54-4C1E-B5BE-4D2DA1082E4F}" type="datetimeFigureOut">
               <a:rPr lang="es-ES" smtClean="0"/>
-              <a:t>14/05/2018</a:t>
+              <a:t>17/05/2018</a:t>
             </a:fld>
             <a:endParaRPr lang="es-ES"/>
           </a:p>
@@ -1960,7 +1961,7 @@
           <a:p>
             <a:fld id="{EDAEA687-FD54-4C1E-B5BE-4D2DA1082E4F}" type="datetimeFigureOut">
               <a:rPr lang="es-ES" smtClean="0"/>
-              <a:t>14/05/2018</a:t>
+              <a:t>17/05/2018</a:t>
             </a:fld>
             <a:endParaRPr lang="es-ES"/>
           </a:p>
@@ -2073,7 +2074,7 @@
           <a:p>
             <a:fld id="{EDAEA687-FD54-4C1E-B5BE-4D2DA1082E4F}" type="datetimeFigureOut">
               <a:rPr lang="es-ES" smtClean="0"/>
-              <a:t>14/05/2018</a:t>
+              <a:t>17/05/2018</a:t>
             </a:fld>
             <a:endParaRPr lang="es-ES"/>
           </a:p>
@@ -2384,7 +2385,7 @@
           <a:p>
             <a:fld id="{EDAEA687-FD54-4C1E-B5BE-4D2DA1082E4F}" type="datetimeFigureOut">
               <a:rPr lang="es-ES" smtClean="0"/>
-              <a:t>14/05/2018</a:t>
+              <a:t>17/05/2018</a:t>
             </a:fld>
             <a:endParaRPr lang="es-ES"/>
           </a:p>
@@ -2672,7 +2673,7 @@
           <a:p>
             <a:fld id="{EDAEA687-FD54-4C1E-B5BE-4D2DA1082E4F}" type="datetimeFigureOut">
               <a:rPr lang="es-ES" smtClean="0"/>
-              <a:t>14/05/2018</a:t>
+              <a:t>17/05/2018</a:t>
             </a:fld>
             <a:endParaRPr lang="es-ES"/>
           </a:p>
@@ -2913,7 +2914,7 @@
           <a:p>
             <a:fld id="{EDAEA687-FD54-4C1E-B5BE-4D2DA1082E4F}" type="datetimeFigureOut">
               <a:rPr lang="es-ES" smtClean="0"/>
-              <a:t>14/05/2018</a:t>
+              <a:t>17/05/2018</a:t>
             </a:fld>
             <a:endParaRPr lang="es-ES"/>
           </a:p>
@@ -6717,6 +6718,1264 @@
 </p:sld>
 </file>
 
+<file path=ppt/slides/slide6.xml><?xml version="1.0" encoding="utf-8"?>
+<p:sld xmlns:a="http://schemas.openxmlformats.org/drawingml/2006/main" xmlns:r="http://schemas.openxmlformats.org/officeDocument/2006/relationships" xmlns:p="http://schemas.openxmlformats.org/presentationml/2006/main">
+  <p:cSld>
+    <p:bg>
+      <p:bgPr>
+        <a:gradFill>
+          <a:gsLst>
+            <a:gs pos="0">
+              <a:schemeClr val="bg2">
+                <a:tint val="96000"/>
+                <a:shade val="100000"/>
+                <a:hueMod val="270000"/>
+                <a:satMod val="200000"/>
+                <a:lumMod val="128000"/>
+              </a:schemeClr>
+            </a:gs>
+            <a:gs pos="50000">
+              <a:schemeClr val="bg2">
+                <a:shade val="100000"/>
+                <a:hueMod val="100000"/>
+                <a:satMod val="110000"/>
+                <a:lumMod val="130000"/>
+              </a:schemeClr>
+            </a:gs>
+            <a:gs pos="100000">
+              <a:schemeClr val="bg2">
+                <a:shade val="78000"/>
+                <a:hueMod val="44000"/>
+                <a:satMod val="200000"/>
+                <a:lumMod val="69000"/>
+              </a:schemeClr>
+            </a:gs>
+          </a:gsLst>
+          <a:lin ang="2520000" scaled="0"/>
+        </a:gradFill>
+        <a:effectLst/>
+      </p:bgPr>
+    </p:bg>
+    <p:spTree>
+      <p:nvGrpSpPr>
+        <p:cNvPr id="1" name=""/>
+        <p:cNvGrpSpPr/>
+        <p:nvPr/>
+      </p:nvGrpSpPr>
+      <p:grpSpPr>
+        <a:xfrm>
+          <a:off x="0" y="0"/>
+          <a:ext cx="0" cy="0"/>
+          <a:chOff x="0" y="0"/>
+          <a:chExt cx="0" cy="0"/>
+        </a:xfrm>
+      </p:grpSpPr>
+      <p:sp>
+        <p:nvSpPr>
+          <p:cNvPr id="3" name="Rectángulo 2">
+            <a:extLst>
+              <a:ext uri="{FF2B5EF4-FFF2-40B4-BE49-F238E27FC236}">
+                <a16:creationId xmlns:a16="http://schemas.microsoft.com/office/drawing/2014/main" id="{011DA267-8E11-4F22-937A-CF80E974C997}"/>
+              </a:ext>
+            </a:extLst>
+          </p:cNvPr>
+          <p:cNvSpPr/>
+          <p:nvPr/>
+        </p:nvSpPr>
+        <p:spPr>
+          <a:xfrm>
+            <a:off x="266330" y="2691414"/>
+            <a:ext cx="2104008" cy="914400"/>
+          </a:xfrm>
+          <a:prstGeom prst="rect">
+            <a:avLst/>
+          </a:prstGeom>
+        </p:spPr>
+        <p:style>
+          <a:lnRef idx="2">
+            <a:schemeClr val="accent1">
+              <a:shade val="50000"/>
+            </a:schemeClr>
+          </a:lnRef>
+          <a:fillRef idx="1">
+            <a:schemeClr val="accent1"/>
+          </a:fillRef>
+          <a:effectRef idx="0">
+            <a:schemeClr val="accent1"/>
+          </a:effectRef>
+          <a:fontRef idx="minor">
+            <a:schemeClr val="lt1"/>
+          </a:fontRef>
+        </p:style>
+        <p:txBody>
+          <a:bodyPr rtlCol="0" anchor="ctr"/>
+          <a:lstStyle/>
+          <a:p>
+            <a:pPr algn="ctr"/>
+            <a:r>
+              <a:rPr lang="es-ES" dirty="0"/>
+              <a:t>Maquina de estados</a:t>
+            </a:r>
+          </a:p>
+        </p:txBody>
+      </p:sp>
+      <p:cxnSp>
+        <p:nvCxnSpPr>
+          <p:cNvPr id="9" name="Conector recto de flecha 8">
+            <a:extLst>
+              <a:ext uri="{FF2B5EF4-FFF2-40B4-BE49-F238E27FC236}">
+                <a16:creationId xmlns:a16="http://schemas.microsoft.com/office/drawing/2014/main" id="{1CC9E66A-0DB1-4AA0-9618-5FA6427CA624}"/>
+              </a:ext>
+            </a:extLst>
+          </p:cNvPr>
+          <p:cNvCxnSpPr>
+            <a:cxnSpLocks/>
+            <a:stCxn id="3" idx="3"/>
+            <a:endCxn id="21" idx="2"/>
+          </p:cNvCxnSpPr>
+          <p:nvPr/>
+        </p:nvCxnSpPr>
+        <p:spPr>
+          <a:xfrm flipV="1">
+            <a:off x="2370338" y="1940495"/>
+            <a:ext cx="1518080" cy="1208119"/>
+          </a:xfrm>
+          <a:prstGeom prst="straightConnector1">
+            <a:avLst/>
+          </a:prstGeom>
+          <a:ln>
+            <a:tailEnd type="triangle"/>
+          </a:ln>
+        </p:spPr>
+        <p:style>
+          <a:lnRef idx="1">
+            <a:schemeClr val="accent1"/>
+          </a:lnRef>
+          <a:fillRef idx="0">
+            <a:schemeClr val="accent1"/>
+          </a:fillRef>
+          <a:effectRef idx="0">
+            <a:schemeClr val="accent1"/>
+          </a:effectRef>
+          <a:fontRef idx="minor">
+            <a:schemeClr val="tx1"/>
+          </a:fontRef>
+        </p:style>
+      </p:cxnSp>
+      <p:cxnSp>
+        <p:nvCxnSpPr>
+          <p:cNvPr id="12" name="Conector recto de flecha 11">
+            <a:extLst>
+              <a:ext uri="{FF2B5EF4-FFF2-40B4-BE49-F238E27FC236}">
+                <a16:creationId xmlns:a16="http://schemas.microsoft.com/office/drawing/2014/main" id="{65B57FC2-015D-4051-8A49-457B3E40CEE6}"/>
+              </a:ext>
+            </a:extLst>
+          </p:cNvPr>
+          <p:cNvCxnSpPr>
+            <a:cxnSpLocks/>
+            <a:stCxn id="3" idx="3"/>
+            <a:endCxn id="22" idx="2"/>
+          </p:cNvCxnSpPr>
+          <p:nvPr/>
+        </p:nvCxnSpPr>
+        <p:spPr>
+          <a:xfrm>
+            <a:off x="2370338" y="3148614"/>
+            <a:ext cx="1518080" cy="173084"/>
+          </a:xfrm>
+          <a:prstGeom prst="straightConnector1">
+            <a:avLst/>
+          </a:prstGeom>
+          <a:ln>
+            <a:tailEnd type="triangle"/>
+          </a:ln>
+        </p:spPr>
+        <p:style>
+          <a:lnRef idx="1">
+            <a:schemeClr val="accent1"/>
+          </a:lnRef>
+          <a:fillRef idx="0">
+            <a:schemeClr val="accent1"/>
+          </a:fillRef>
+          <a:effectRef idx="0">
+            <a:schemeClr val="accent1"/>
+          </a:effectRef>
+          <a:fontRef idx="minor">
+            <a:schemeClr val="tx1"/>
+          </a:fontRef>
+        </p:style>
+      </p:cxnSp>
+      <p:cxnSp>
+        <p:nvCxnSpPr>
+          <p:cNvPr id="20" name="Conector recto de flecha 19">
+            <a:extLst>
+              <a:ext uri="{FF2B5EF4-FFF2-40B4-BE49-F238E27FC236}">
+                <a16:creationId xmlns:a16="http://schemas.microsoft.com/office/drawing/2014/main" id="{CE053AB0-3E9B-488E-882F-C06DFE91896E}"/>
+              </a:ext>
+            </a:extLst>
+          </p:cNvPr>
+          <p:cNvCxnSpPr>
+            <a:cxnSpLocks/>
+            <a:stCxn id="3" idx="3"/>
+            <a:endCxn id="23" idx="2"/>
+          </p:cNvCxnSpPr>
+          <p:nvPr/>
+        </p:nvCxnSpPr>
+        <p:spPr>
+          <a:xfrm>
+            <a:off x="2370338" y="3148614"/>
+            <a:ext cx="1518080" cy="1679392"/>
+          </a:xfrm>
+          <a:prstGeom prst="straightConnector1">
+            <a:avLst/>
+          </a:prstGeom>
+          <a:ln>
+            <a:tailEnd type="triangle"/>
+          </a:ln>
+        </p:spPr>
+        <p:style>
+          <a:lnRef idx="1">
+            <a:schemeClr val="accent1"/>
+          </a:lnRef>
+          <a:fillRef idx="0">
+            <a:schemeClr val="accent1"/>
+          </a:fillRef>
+          <a:effectRef idx="0">
+            <a:schemeClr val="accent1"/>
+          </a:effectRef>
+          <a:fontRef idx="minor">
+            <a:schemeClr val="tx1"/>
+          </a:fontRef>
+        </p:style>
+      </p:cxnSp>
+      <p:cxnSp>
+        <p:nvCxnSpPr>
+          <p:cNvPr id="24" name="Conector recto de flecha 23">
+            <a:extLst>
+              <a:ext uri="{FF2B5EF4-FFF2-40B4-BE49-F238E27FC236}">
+                <a16:creationId xmlns:a16="http://schemas.microsoft.com/office/drawing/2014/main" id="{BE201B90-68C7-4520-B642-8216A746E5B3}"/>
+              </a:ext>
+            </a:extLst>
+          </p:cNvPr>
+          <p:cNvCxnSpPr>
+            <a:cxnSpLocks/>
+            <a:endCxn id="25" idx="2"/>
+          </p:cNvCxnSpPr>
+          <p:nvPr/>
+        </p:nvCxnSpPr>
+        <p:spPr>
+          <a:xfrm>
+            <a:off x="2370338" y="3160112"/>
+            <a:ext cx="1518080" cy="3083490"/>
+          </a:xfrm>
+          <a:prstGeom prst="straightConnector1">
+            <a:avLst/>
+          </a:prstGeom>
+          <a:ln>
+            <a:tailEnd type="triangle"/>
+          </a:ln>
+        </p:spPr>
+        <p:style>
+          <a:lnRef idx="1">
+            <a:schemeClr val="accent1"/>
+          </a:lnRef>
+          <a:fillRef idx="0">
+            <a:schemeClr val="accent1"/>
+          </a:fillRef>
+          <a:effectRef idx="0">
+            <a:schemeClr val="accent1"/>
+          </a:effectRef>
+          <a:fontRef idx="minor">
+            <a:schemeClr val="tx1"/>
+          </a:fontRef>
+        </p:style>
+      </p:cxnSp>
+      <p:sp>
+        <p:nvSpPr>
+          <p:cNvPr id="2" name="Elipse 1">
+            <a:extLst>
+              <a:ext uri="{FF2B5EF4-FFF2-40B4-BE49-F238E27FC236}">
+                <a16:creationId xmlns:a16="http://schemas.microsoft.com/office/drawing/2014/main" id="{3DC00789-61EF-499F-9DAD-B66FA935EAB8}"/>
+              </a:ext>
+            </a:extLst>
+          </p:cNvPr>
+          <p:cNvSpPr/>
+          <p:nvPr/>
+        </p:nvSpPr>
+        <p:spPr>
+          <a:xfrm>
+            <a:off x="3888418" y="0"/>
+            <a:ext cx="1793288" cy="1020901"/>
+          </a:xfrm>
+          <a:prstGeom prst="ellipse">
+            <a:avLst/>
+          </a:prstGeom>
+        </p:spPr>
+        <p:style>
+          <a:lnRef idx="2">
+            <a:schemeClr val="accent1">
+              <a:shade val="50000"/>
+            </a:schemeClr>
+          </a:lnRef>
+          <a:fillRef idx="1">
+            <a:schemeClr val="accent1"/>
+          </a:fillRef>
+          <a:effectRef idx="0">
+            <a:schemeClr val="accent1"/>
+          </a:effectRef>
+          <a:fontRef idx="minor">
+            <a:schemeClr val="lt1"/>
+          </a:fontRef>
+        </p:style>
+        <p:txBody>
+          <a:bodyPr rtlCol="0" anchor="ctr"/>
+          <a:lstStyle/>
+          <a:p>
+            <a:pPr algn="ctr"/>
+            <a:r>
+              <a:rPr lang="es-ES" dirty="0"/>
+              <a:t>Quieto</a:t>
+            </a:r>
+          </a:p>
+        </p:txBody>
+      </p:sp>
+      <p:sp>
+        <p:nvSpPr>
+          <p:cNvPr id="21" name="Elipse 20">
+            <a:extLst>
+              <a:ext uri="{FF2B5EF4-FFF2-40B4-BE49-F238E27FC236}">
+                <a16:creationId xmlns:a16="http://schemas.microsoft.com/office/drawing/2014/main" id="{EE689883-D9B6-47AD-9C0F-44E4E0F4CE84}"/>
+              </a:ext>
+            </a:extLst>
+          </p:cNvPr>
+          <p:cNvSpPr/>
+          <p:nvPr/>
+        </p:nvSpPr>
+        <p:spPr>
+          <a:xfrm>
+            <a:off x="3888418" y="1430044"/>
+            <a:ext cx="1793288" cy="1020901"/>
+          </a:xfrm>
+          <a:prstGeom prst="ellipse">
+            <a:avLst/>
+          </a:prstGeom>
+        </p:spPr>
+        <p:style>
+          <a:lnRef idx="2">
+            <a:schemeClr val="accent1">
+              <a:shade val="50000"/>
+            </a:schemeClr>
+          </a:lnRef>
+          <a:fillRef idx="1">
+            <a:schemeClr val="accent1"/>
+          </a:fillRef>
+          <a:effectRef idx="0">
+            <a:schemeClr val="accent1"/>
+          </a:effectRef>
+          <a:fontRef idx="minor">
+            <a:schemeClr val="lt1"/>
+          </a:fontRef>
+        </p:style>
+        <p:txBody>
+          <a:bodyPr rtlCol="0" anchor="ctr"/>
+          <a:lstStyle/>
+          <a:p>
+            <a:pPr algn="ctr"/>
+            <a:r>
+              <a:rPr lang="es-ES" dirty="0"/>
+              <a:t>Patrullar</a:t>
+            </a:r>
+          </a:p>
+        </p:txBody>
+      </p:sp>
+      <p:sp>
+        <p:nvSpPr>
+          <p:cNvPr id="22" name="Elipse 21">
+            <a:extLst>
+              <a:ext uri="{FF2B5EF4-FFF2-40B4-BE49-F238E27FC236}">
+                <a16:creationId xmlns:a16="http://schemas.microsoft.com/office/drawing/2014/main" id="{9D6D1863-71F5-41A4-A591-66EA38113072}"/>
+              </a:ext>
+            </a:extLst>
+          </p:cNvPr>
+          <p:cNvSpPr/>
+          <p:nvPr/>
+        </p:nvSpPr>
+        <p:spPr>
+          <a:xfrm>
+            <a:off x="3888418" y="2811247"/>
+            <a:ext cx="1793288" cy="1020901"/>
+          </a:xfrm>
+          <a:prstGeom prst="ellipse">
+            <a:avLst/>
+          </a:prstGeom>
+        </p:spPr>
+        <p:style>
+          <a:lnRef idx="2">
+            <a:schemeClr val="accent1">
+              <a:shade val="50000"/>
+            </a:schemeClr>
+          </a:lnRef>
+          <a:fillRef idx="1">
+            <a:schemeClr val="accent1"/>
+          </a:fillRef>
+          <a:effectRef idx="0">
+            <a:schemeClr val="accent1"/>
+          </a:effectRef>
+          <a:fontRef idx="minor">
+            <a:schemeClr val="lt1"/>
+          </a:fontRef>
+        </p:style>
+        <p:txBody>
+          <a:bodyPr rtlCol="0" anchor="ctr"/>
+          <a:lstStyle/>
+          <a:p>
+            <a:pPr algn="ctr"/>
+            <a:r>
+              <a:rPr lang="es-ES" dirty="0"/>
+              <a:t>Perseguir</a:t>
+            </a:r>
+          </a:p>
+        </p:txBody>
+      </p:sp>
+      <p:sp>
+        <p:nvSpPr>
+          <p:cNvPr id="23" name="Elipse 22">
+            <a:extLst>
+              <a:ext uri="{FF2B5EF4-FFF2-40B4-BE49-F238E27FC236}">
+                <a16:creationId xmlns:a16="http://schemas.microsoft.com/office/drawing/2014/main" id="{240793CA-A2B1-427D-AE51-36E29CD99271}"/>
+              </a:ext>
+            </a:extLst>
+          </p:cNvPr>
+          <p:cNvSpPr/>
+          <p:nvPr/>
+        </p:nvSpPr>
+        <p:spPr>
+          <a:xfrm>
+            <a:off x="3888418" y="4317555"/>
+            <a:ext cx="1793288" cy="1020901"/>
+          </a:xfrm>
+          <a:prstGeom prst="ellipse">
+            <a:avLst/>
+          </a:prstGeom>
+        </p:spPr>
+        <p:style>
+          <a:lnRef idx="2">
+            <a:schemeClr val="accent1">
+              <a:shade val="50000"/>
+            </a:schemeClr>
+          </a:lnRef>
+          <a:fillRef idx="1">
+            <a:schemeClr val="accent1"/>
+          </a:fillRef>
+          <a:effectRef idx="0">
+            <a:schemeClr val="accent1"/>
+          </a:effectRef>
+          <a:fontRef idx="minor">
+            <a:schemeClr val="lt1"/>
+          </a:fontRef>
+        </p:style>
+        <p:txBody>
+          <a:bodyPr rtlCol="0" anchor="ctr"/>
+          <a:lstStyle/>
+          <a:p>
+            <a:pPr algn="ctr"/>
+            <a:r>
+              <a:rPr lang="es-ES" dirty="0"/>
+              <a:t>Buscar</a:t>
+            </a:r>
+          </a:p>
+        </p:txBody>
+      </p:sp>
+      <p:sp>
+        <p:nvSpPr>
+          <p:cNvPr id="25" name="Elipse 24">
+            <a:extLst>
+              <a:ext uri="{FF2B5EF4-FFF2-40B4-BE49-F238E27FC236}">
+                <a16:creationId xmlns:a16="http://schemas.microsoft.com/office/drawing/2014/main" id="{389E13F7-86A5-4A48-BFC6-549116D3A6AA}"/>
+              </a:ext>
+            </a:extLst>
+          </p:cNvPr>
+          <p:cNvSpPr/>
+          <p:nvPr/>
+        </p:nvSpPr>
+        <p:spPr>
+          <a:xfrm>
+            <a:off x="3888418" y="5733151"/>
+            <a:ext cx="1793288" cy="1020901"/>
+          </a:xfrm>
+          <a:prstGeom prst="ellipse">
+            <a:avLst/>
+          </a:prstGeom>
+        </p:spPr>
+        <p:style>
+          <a:lnRef idx="2">
+            <a:schemeClr val="accent1">
+              <a:shade val="50000"/>
+            </a:schemeClr>
+          </a:lnRef>
+          <a:fillRef idx="1">
+            <a:schemeClr val="accent1"/>
+          </a:fillRef>
+          <a:effectRef idx="0">
+            <a:schemeClr val="accent1"/>
+          </a:effectRef>
+          <a:fontRef idx="minor">
+            <a:schemeClr val="lt1"/>
+          </a:fontRef>
+        </p:style>
+        <p:txBody>
+          <a:bodyPr rtlCol="0" anchor="ctr"/>
+          <a:lstStyle/>
+          <a:p>
+            <a:pPr algn="ctr"/>
+            <a:r>
+              <a:rPr lang="es-ES" dirty="0"/>
+              <a:t>Atacar</a:t>
+            </a:r>
+          </a:p>
+        </p:txBody>
+      </p:sp>
+      <p:cxnSp>
+        <p:nvCxnSpPr>
+          <p:cNvPr id="13" name="Conector recto de flecha 12">
+            <a:extLst>
+              <a:ext uri="{FF2B5EF4-FFF2-40B4-BE49-F238E27FC236}">
+                <a16:creationId xmlns:a16="http://schemas.microsoft.com/office/drawing/2014/main" id="{B696370A-0B7F-48F4-895B-5284244B85AB}"/>
+              </a:ext>
+            </a:extLst>
+          </p:cNvPr>
+          <p:cNvCxnSpPr>
+            <a:stCxn id="3" idx="3"/>
+            <a:endCxn id="2" idx="2"/>
+          </p:cNvCxnSpPr>
+          <p:nvPr/>
+        </p:nvCxnSpPr>
+        <p:spPr>
+          <a:xfrm flipV="1">
+            <a:off x="2370338" y="510451"/>
+            <a:ext cx="1518080" cy="2638163"/>
+          </a:xfrm>
+          <a:prstGeom prst="straightConnector1">
+            <a:avLst/>
+          </a:prstGeom>
+          <a:ln>
+            <a:tailEnd type="triangle"/>
+          </a:ln>
+        </p:spPr>
+        <p:style>
+          <a:lnRef idx="1">
+            <a:schemeClr val="accent1"/>
+          </a:lnRef>
+          <a:fillRef idx="0">
+            <a:schemeClr val="accent1"/>
+          </a:fillRef>
+          <a:effectRef idx="0">
+            <a:schemeClr val="accent1"/>
+          </a:effectRef>
+          <a:fontRef idx="minor">
+            <a:schemeClr val="tx1"/>
+          </a:fontRef>
+        </p:style>
+      </p:cxnSp>
+      <p:sp>
+        <p:nvSpPr>
+          <p:cNvPr id="31" name="Rectángulo: esquinas redondeadas 30">
+            <a:extLst>
+              <a:ext uri="{FF2B5EF4-FFF2-40B4-BE49-F238E27FC236}">
+                <a16:creationId xmlns:a16="http://schemas.microsoft.com/office/drawing/2014/main" id="{49020BA3-B3DD-4689-AE1B-E776BA57FA95}"/>
+              </a:ext>
+            </a:extLst>
+          </p:cNvPr>
+          <p:cNvSpPr/>
+          <p:nvPr/>
+        </p:nvSpPr>
+        <p:spPr>
+          <a:xfrm>
+            <a:off x="7115448" y="1474723"/>
+            <a:ext cx="1518082" cy="834470"/>
+          </a:xfrm>
+          <a:prstGeom prst="roundRect">
+            <a:avLst/>
+          </a:prstGeom>
+        </p:spPr>
+        <p:style>
+          <a:lnRef idx="2">
+            <a:schemeClr val="accent1">
+              <a:shade val="50000"/>
+            </a:schemeClr>
+          </a:lnRef>
+          <a:fillRef idx="1">
+            <a:schemeClr val="accent1"/>
+          </a:fillRef>
+          <a:effectRef idx="0">
+            <a:schemeClr val="accent1"/>
+          </a:effectRef>
+          <a:fontRef idx="minor">
+            <a:schemeClr val="lt1"/>
+          </a:fontRef>
+        </p:style>
+        <p:txBody>
+          <a:bodyPr rtlCol="0" anchor="ctr"/>
+          <a:lstStyle/>
+          <a:p>
+            <a:pPr algn="ctr"/>
+            <a:r>
+              <a:rPr lang="es-ES" dirty="0"/>
+              <a:t>Buscar punto de ruta</a:t>
+            </a:r>
+          </a:p>
+        </p:txBody>
+      </p:sp>
+      <p:sp>
+        <p:nvSpPr>
+          <p:cNvPr id="32" name="Rectángulo: esquinas redondeadas 31">
+            <a:extLst>
+              <a:ext uri="{FF2B5EF4-FFF2-40B4-BE49-F238E27FC236}">
+                <a16:creationId xmlns:a16="http://schemas.microsoft.com/office/drawing/2014/main" id="{847E183C-FFC3-4007-ACC0-E7D9B106617B}"/>
+              </a:ext>
+            </a:extLst>
+          </p:cNvPr>
+          <p:cNvSpPr/>
+          <p:nvPr/>
+        </p:nvSpPr>
+        <p:spPr>
+          <a:xfrm>
+            <a:off x="7306313" y="2904462"/>
+            <a:ext cx="1518082" cy="834470"/>
+          </a:xfrm>
+          <a:prstGeom prst="roundRect">
+            <a:avLst/>
+          </a:prstGeom>
+        </p:spPr>
+        <p:style>
+          <a:lnRef idx="2">
+            <a:schemeClr val="accent1">
+              <a:shade val="50000"/>
+            </a:schemeClr>
+          </a:lnRef>
+          <a:fillRef idx="1">
+            <a:schemeClr val="accent1"/>
+          </a:fillRef>
+          <a:effectRef idx="0">
+            <a:schemeClr val="accent1"/>
+          </a:effectRef>
+          <a:fontRef idx="minor">
+            <a:schemeClr val="lt1"/>
+          </a:fontRef>
+        </p:style>
+        <p:txBody>
+          <a:bodyPr rtlCol="0" anchor="ctr"/>
+          <a:lstStyle/>
+          <a:p>
+            <a:pPr algn="ctr"/>
+            <a:r>
+              <a:rPr lang="es-ES" dirty="0"/>
+              <a:t>Ir hacia el jugador</a:t>
+            </a:r>
+          </a:p>
+        </p:txBody>
+      </p:sp>
+      <p:sp>
+        <p:nvSpPr>
+          <p:cNvPr id="34" name="Rectángulo: esquinas redondeadas 33">
+            <a:extLst>
+              <a:ext uri="{FF2B5EF4-FFF2-40B4-BE49-F238E27FC236}">
+                <a16:creationId xmlns:a16="http://schemas.microsoft.com/office/drawing/2014/main" id="{E5183FC2-2847-4292-A43A-687FD16155A7}"/>
+              </a:ext>
+            </a:extLst>
+          </p:cNvPr>
+          <p:cNvSpPr/>
+          <p:nvPr/>
+        </p:nvSpPr>
+        <p:spPr>
+          <a:xfrm>
+            <a:off x="7461677" y="4405237"/>
+            <a:ext cx="1518082" cy="834470"/>
+          </a:xfrm>
+          <a:prstGeom prst="roundRect">
+            <a:avLst/>
+          </a:prstGeom>
+        </p:spPr>
+        <p:style>
+          <a:lnRef idx="2">
+            <a:schemeClr val="accent1">
+              <a:shade val="50000"/>
+            </a:schemeClr>
+          </a:lnRef>
+          <a:fillRef idx="1">
+            <a:schemeClr val="accent1"/>
+          </a:fillRef>
+          <a:effectRef idx="0">
+            <a:schemeClr val="accent1"/>
+          </a:effectRef>
+          <a:fontRef idx="minor">
+            <a:schemeClr val="lt1"/>
+          </a:fontRef>
+        </p:style>
+        <p:txBody>
+          <a:bodyPr rtlCol="0" anchor="ctr"/>
+          <a:lstStyle/>
+          <a:p>
+            <a:pPr algn="ctr"/>
+            <a:r>
+              <a:rPr lang="es-ES" dirty="0"/>
+              <a:t>Ir al último punto</a:t>
+            </a:r>
+          </a:p>
+        </p:txBody>
+      </p:sp>
+      <p:sp>
+        <p:nvSpPr>
+          <p:cNvPr id="36" name="Rectángulo: esquinas redondeadas 35">
+            <a:extLst>
+              <a:ext uri="{FF2B5EF4-FFF2-40B4-BE49-F238E27FC236}">
+                <a16:creationId xmlns:a16="http://schemas.microsoft.com/office/drawing/2014/main" id="{4203B9E3-5571-41B4-8ECC-170BB6DA1C59}"/>
+              </a:ext>
+            </a:extLst>
+          </p:cNvPr>
+          <p:cNvSpPr/>
+          <p:nvPr/>
+        </p:nvSpPr>
+        <p:spPr>
+          <a:xfrm>
+            <a:off x="7199786" y="5826366"/>
+            <a:ext cx="1518082" cy="834470"/>
+          </a:xfrm>
+          <a:prstGeom prst="roundRect">
+            <a:avLst/>
+          </a:prstGeom>
+        </p:spPr>
+        <p:style>
+          <a:lnRef idx="2">
+            <a:schemeClr val="accent1">
+              <a:shade val="50000"/>
+            </a:schemeClr>
+          </a:lnRef>
+          <a:fillRef idx="1">
+            <a:schemeClr val="accent1"/>
+          </a:fillRef>
+          <a:effectRef idx="0">
+            <a:schemeClr val="accent1"/>
+          </a:effectRef>
+          <a:fontRef idx="minor">
+            <a:schemeClr val="lt1"/>
+          </a:fontRef>
+        </p:style>
+        <p:txBody>
+          <a:bodyPr rtlCol="0" anchor="ctr"/>
+          <a:lstStyle/>
+          <a:p>
+            <a:pPr algn="ctr"/>
+            <a:r>
+              <a:rPr lang="es-ES" dirty="0"/>
+              <a:t>Modo combate</a:t>
+            </a:r>
+          </a:p>
+        </p:txBody>
+      </p:sp>
+      <p:cxnSp>
+        <p:nvCxnSpPr>
+          <p:cNvPr id="37" name="Conector recto de flecha 36">
+            <a:extLst>
+              <a:ext uri="{FF2B5EF4-FFF2-40B4-BE49-F238E27FC236}">
+                <a16:creationId xmlns:a16="http://schemas.microsoft.com/office/drawing/2014/main" id="{6A003108-C727-440E-9E47-D68934D92E93}"/>
+              </a:ext>
+            </a:extLst>
+          </p:cNvPr>
+          <p:cNvCxnSpPr>
+            <a:stCxn id="21" idx="6"/>
+            <a:endCxn id="31" idx="1"/>
+          </p:cNvCxnSpPr>
+          <p:nvPr/>
+        </p:nvCxnSpPr>
+        <p:spPr>
+          <a:xfrm flipV="1">
+            <a:off x="5681706" y="1891958"/>
+            <a:ext cx="1433742" cy="48537"/>
+          </a:xfrm>
+          <a:prstGeom prst="straightConnector1">
+            <a:avLst/>
+          </a:prstGeom>
+          <a:ln>
+            <a:tailEnd type="triangle"/>
+          </a:ln>
+        </p:spPr>
+        <p:style>
+          <a:lnRef idx="1">
+            <a:schemeClr val="accent1"/>
+          </a:lnRef>
+          <a:fillRef idx="0">
+            <a:schemeClr val="accent1"/>
+          </a:fillRef>
+          <a:effectRef idx="0">
+            <a:schemeClr val="accent1"/>
+          </a:effectRef>
+          <a:fontRef idx="minor">
+            <a:schemeClr val="tx1"/>
+          </a:fontRef>
+        </p:style>
+      </p:cxnSp>
+      <p:cxnSp>
+        <p:nvCxnSpPr>
+          <p:cNvPr id="39" name="Conector recto de flecha 38">
+            <a:extLst>
+              <a:ext uri="{FF2B5EF4-FFF2-40B4-BE49-F238E27FC236}">
+                <a16:creationId xmlns:a16="http://schemas.microsoft.com/office/drawing/2014/main" id="{35E1F6EA-7AA3-461C-8869-44521E94497A}"/>
+              </a:ext>
+            </a:extLst>
+          </p:cNvPr>
+          <p:cNvCxnSpPr>
+            <a:stCxn id="22" idx="6"/>
+            <a:endCxn id="32" idx="1"/>
+          </p:cNvCxnSpPr>
+          <p:nvPr/>
+        </p:nvCxnSpPr>
+        <p:spPr>
+          <a:xfrm flipV="1">
+            <a:off x="5681706" y="3321697"/>
+            <a:ext cx="1624607" cy="1"/>
+          </a:xfrm>
+          <a:prstGeom prst="straightConnector1">
+            <a:avLst/>
+          </a:prstGeom>
+          <a:ln>
+            <a:tailEnd type="triangle"/>
+          </a:ln>
+        </p:spPr>
+        <p:style>
+          <a:lnRef idx="1">
+            <a:schemeClr val="accent1"/>
+          </a:lnRef>
+          <a:fillRef idx="0">
+            <a:schemeClr val="accent1"/>
+          </a:fillRef>
+          <a:effectRef idx="0">
+            <a:schemeClr val="accent1"/>
+          </a:effectRef>
+          <a:fontRef idx="minor">
+            <a:schemeClr val="tx1"/>
+          </a:fontRef>
+        </p:style>
+      </p:cxnSp>
+      <p:cxnSp>
+        <p:nvCxnSpPr>
+          <p:cNvPr id="41" name="Conector recto de flecha 40">
+            <a:extLst>
+              <a:ext uri="{FF2B5EF4-FFF2-40B4-BE49-F238E27FC236}">
+                <a16:creationId xmlns:a16="http://schemas.microsoft.com/office/drawing/2014/main" id="{A62076D6-A95F-4E89-A36A-D2AB8213B690}"/>
+              </a:ext>
+            </a:extLst>
+          </p:cNvPr>
+          <p:cNvCxnSpPr>
+            <a:stCxn id="23" idx="6"/>
+            <a:endCxn id="34" idx="1"/>
+          </p:cNvCxnSpPr>
+          <p:nvPr/>
+        </p:nvCxnSpPr>
+        <p:spPr>
+          <a:xfrm flipV="1">
+            <a:off x="5681706" y="4822472"/>
+            <a:ext cx="1779971" cy="5534"/>
+          </a:xfrm>
+          <a:prstGeom prst="straightConnector1">
+            <a:avLst/>
+          </a:prstGeom>
+          <a:ln>
+            <a:tailEnd type="triangle"/>
+          </a:ln>
+        </p:spPr>
+        <p:style>
+          <a:lnRef idx="1">
+            <a:schemeClr val="accent1"/>
+          </a:lnRef>
+          <a:fillRef idx="0">
+            <a:schemeClr val="accent1"/>
+          </a:fillRef>
+          <a:effectRef idx="0">
+            <a:schemeClr val="accent1"/>
+          </a:effectRef>
+          <a:fontRef idx="minor">
+            <a:schemeClr val="tx1"/>
+          </a:fontRef>
+        </p:style>
+      </p:cxnSp>
+      <p:cxnSp>
+        <p:nvCxnSpPr>
+          <p:cNvPr id="43" name="Conector recto de flecha 42">
+            <a:extLst>
+              <a:ext uri="{FF2B5EF4-FFF2-40B4-BE49-F238E27FC236}">
+                <a16:creationId xmlns:a16="http://schemas.microsoft.com/office/drawing/2014/main" id="{DE695E67-E10A-4E76-A595-B8C2F11647B3}"/>
+              </a:ext>
+            </a:extLst>
+          </p:cNvPr>
+          <p:cNvCxnSpPr>
+            <a:stCxn id="25" idx="6"/>
+            <a:endCxn id="36" idx="1"/>
+          </p:cNvCxnSpPr>
+          <p:nvPr/>
+        </p:nvCxnSpPr>
+        <p:spPr>
+          <a:xfrm flipV="1">
+            <a:off x="5681706" y="6243601"/>
+            <a:ext cx="1518080" cy="1"/>
+          </a:xfrm>
+          <a:prstGeom prst="straightConnector1">
+            <a:avLst/>
+          </a:prstGeom>
+          <a:ln>
+            <a:tailEnd type="triangle"/>
+          </a:ln>
+        </p:spPr>
+        <p:style>
+          <a:lnRef idx="1">
+            <a:schemeClr val="accent1"/>
+          </a:lnRef>
+          <a:fillRef idx="0">
+            <a:schemeClr val="accent1"/>
+          </a:fillRef>
+          <a:effectRef idx="0">
+            <a:schemeClr val="accent1"/>
+          </a:effectRef>
+          <a:fontRef idx="minor">
+            <a:schemeClr val="tx1"/>
+          </a:fontRef>
+        </p:style>
+      </p:cxnSp>
+      <p:sp>
+        <p:nvSpPr>
+          <p:cNvPr id="55" name="Rectángulo: esquinas redondeadas 54">
+            <a:extLst>
+              <a:ext uri="{FF2B5EF4-FFF2-40B4-BE49-F238E27FC236}">
+                <a16:creationId xmlns:a16="http://schemas.microsoft.com/office/drawing/2014/main" id="{45133628-6D9B-4077-A55B-5C61F2E1FD23}"/>
+              </a:ext>
+            </a:extLst>
+          </p:cNvPr>
+          <p:cNvSpPr/>
+          <p:nvPr/>
+        </p:nvSpPr>
+        <p:spPr>
+          <a:xfrm>
+            <a:off x="9505021" y="1430044"/>
+            <a:ext cx="1518082" cy="834470"/>
+          </a:xfrm>
+          <a:prstGeom prst="roundRect">
+            <a:avLst/>
+          </a:prstGeom>
+        </p:spPr>
+        <p:style>
+          <a:lnRef idx="2">
+            <a:schemeClr val="accent1">
+              <a:shade val="50000"/>
+            </a:schemeClr>
+          </a:lnRef>
+          <a:fillRef idx="1">
+            <a:schemeClr val="accent1"/>
+          </a:fillRef>
+          <a:effectRef idx="0">
+            <a:schemeClr val="accent1"/>
+          </a:effectRef>
+          <a:fontRef idx="minor">
+            <a:schemeClr val="lt1"/>
+          </a:fontRef>
+        </p:style>
+        <p:txBody>
+          <a:bodyPr rtlCol="0" anchor="ctr"/>
+          <a:lstStyle/>
+          <a:p>
+            <a:pPr algn="ctr"/>
+            <a:r>
+              <a:rPr lang="es-ES" dirty="0"/>
+              <a:t>Ir al punto de ruta</a:t>
+            </a:r>
+          </a:p>
+        </p:txBody>
+      </p:sp>
+      <p:cxnSp>
+        <p:nvCxnSpPr>
+          <p:cNvPr id="57" name="Conector recto de flecha 56">
+            <a:extLst>
+              <a:ext uri="{FF2B5EF4-FFF2-40B4-BE49-F238E27FC236}">
+                <a16:creationId xmlns:a16="http://schemas.microsoft.com/office/drawing/2014/main" id="{F789C19C-3263-4B4F-9EC6-08416D79C0A0}"/>
+              </a:ext>
+            </a:extLst>
+          </p:cNvPr>
+          <p:cNvCxnSpPr>
+            <a:stCxn id="31" idx="3"/>
+            <a:endCxn id="55" idx="1"/>
+          </p:cNvCxnSpPr>
+          <p:nvPr/>
+        </p:nvCxnSpPr>
+        <p:spPr>
+          <a:xfrm flipV="1">
+            <a:off x="8633530" y="1847279"/>
+            <a:ext cx="871491" cy="44679"/>
+          </a:xfrm>
+          <a:prstGeom prst="straightConnector1">
+            <a:avLst/>
+          </a:prstGeom>
+          <a:ln>
+            <a:tailEnd type="triangle"/>
+          </a:ln>
+        </p:spPr>
+        <p:style>
+          <a:lnRef idx="1">
+            <a:schemeClr val="accent1"/>
+          </a:lnRef>
+          <a:fillRef idx="0">
+            <a:schemeClr val="accent1"/>
+          </a:fillRef>
+          <a:effectRef idx="0">
+            <a:schemeClr val="accent1"/>
+          </a:effectRef>
+          <a:fontRef idx="minor">
+            <a:schemeClr val="tx1"/>
+          </a:fontRef>
+        </p:style>
+      </p:cxnSp>
+      <p:sp>
+        <p:nvSpPr>
+          <p:cNvPr id="58" name="CuadroTexto 57">
+            <a:extLst>
+              <a:ext uri="{FF2B5EF4-FFF2-40B4-BE49-F238E27FC236}">
+                <a16:creationId xmlns:a16="http://schemas.microsoft.com/office/drawing/2014/main" id="{7AE199E7-ADAF-4315-B3B8-37962ECFE3A9}"/>
+              </a:ext>
+            </a:extLst>
+          </p:cNvPr>
+          <p:cNvSpPr txBox="1"/>
+          <p:nvPr/>
+        </p:nvSpPr>
+        <p:spPr>
+          <a:xfrm>
+            <a:off x="5681706" y="2811248"/>
+            <a:ext cx="1518080" cy="369332"/>
+          </a:xfrm>
+          <a:prstGeom prst="rect">
+            <a:avLst/>
+          </a:prstGeom>
+          <a:noFill/>
+        </p:spPr>
+        <p:txBody>
+          <a:bodyPr wrap="square" rtlCol="0">
+            <a:spAutoFit/>
+          </a:bodyPr>
+          <a:lstStyle/>
+          <a:p>
+            <a:r>
+              <a:rPr lang="es-ES" dirty="0"/>
+              <a:t>Jugador visto</a:t>
+            </a:r>
+          </a:p>
+        </p:txBody>
+      </p:sp>
+      <p:sp>
+        <p:nvSpPr>
+          <p:cNvPr id="60" name="CuadroTexto 59">
+            <a:extLst>
+              <a:ext uri="{FF2B5EF4-FFF2-40B4-BE49-F238E27FC236}">
+                <a16:creationId xmlns:a16="http://schemas.microsoft.com/office/drawing/2014/main" id="{7E6C8D03-ECC5-4D7D-957F-F80CE933751B}"/>
+              </a:ext>
+            </a:extLst>
+          </p:cNvPr>
+          <p:cNvSpPr txBox="1"/>
+          <p:nvPr/>
+        </p:nvSpPr>
+        <p:spPr>
+          <a:xfrm>
+            <a:off x="5597367" y="4355279"/>
+            <a:ext cx="1779971" cy="382013"/>
+          </a:xfrm>
+          <a:prstGeom prst="rect">
+            <a:avLst/>
+          </a:prstGeom>
+          <a:noFill/>
+        </p:spPr>
+        <p:txBody>
+          <a:bodyPr wrap="square" rtlCol="0">
+            <a:spAutoFit/>
+          </a:bodyPr>
+          <a:lstStyle/>
+          <a:p>
+            <a:r>
+              <a:rPr lang="es-ES" dirty="0"/>
+              <a:t>Jugador perdido</a:t>
+            </a:r>
+          </a:p>
+        </p:txBody>
+      </p:sp>
+      <p:sp>
+        <p:nvSpPr>
+          <p:cNvPr id="62" name="CuadroTexto 61">
+            <a:extLst>
+              <a:ext uri="{FF2B5EF4-FFF2-40B4-BE49-F238E27FC236}">
+                <a16:creationId xmlns:a16="http://schemas.microsoft.com/office/drawing/2014/main" id="{21E8FCB5-D7A1-48D6-AF44-0C18F16ACFE2}"/>
+              </a:ext>
+            </a:extLst>
+          </p:cNvPr>
+          <p:cNvSpPr txBox="1"/>
+          <p:nvPr/>
+        </p:nvSpPr>
+        <p:spPr>
+          <a:xfrm>
+            <a:off x="5639537" y="5676921"/>
+            <a:ext cx="1518080" cy="369332"/>
+          </a:xfrm>
+          <a:prstGeom prst="rect">
+            <a:avLst/>
+          </a:prstGeom>
+          <a:noFill/>
+        </p:spPr>
+        <p:txBody>
+          <a:bodyPr wrap="square" rtlCol="0">
+            <a:spAutoFit/>
+          </a:bodyPr>
+          <a:lstStyle/>
+          <a:p>
+            <a:r>
+              <a:rPr lang="es-ES" dirty="0"/>
+              <a:t>Jugador cerca</a:t>
+            </a:r>
+          </a:p>
+        </p:txBody>
+      </p:sp>
+      <p:sp>
+        <p:nvSpPr>
+          <p:cNvPr id="63" name="Rectángulo: esquinas redondeadas 62">
+            <a:extLst>
+              <a:ext uri="{FF2B5EF4-FFF2-40B4-BE49-F238E27FC236}">
+                <a16:creationId xmlns:a16="http://schemas.microsoft.com/office/drawing/2014/main" id="{9A461647-0D53-4437-9C20-82C80012D3ED}"/>
+              </a:ext>
+            </a:extLst>
+          </p:cNvPr>
+          <p:cNvSpPr/>
+          <p:nvPr/>
+        </p:nvSpPr>
+        <p:spPr>
+          <a:xfrm>
+            <a:off x="10525943" y="5826366"/>
+            <a:ext cx="1518082" cy="834470"/>
+          </a:xfrm>
+          <a:prstGeom prst="roundRect">
+            <a:avLst/>
+          </a:prstGeom>
+        </p:spPr>
+        <p:style>
+          <a:lnRef idx="2">
+            <a:schemeClr val="accent1">
+              <a:shade val="50000"/>
+            </a:schemeClr>
+          </a:lnRef>
+          <a:fillRef idx="1">
+            <a:schemeClr val="accent1"/>
+          </a:fillRef>
+          <a:effectRef idx="0">
+            <a:schemeClr val="accent1"/>
+          </a:effectRef>
+          <a:fontRef idx="minor">
+            <a:schemeClr val="lt1"/>
+          </a:fontRef>
+        </p:style>
+        <p:txBody>
+          <a:bodyPr rtlCol="0" anchor="ctr"/>
+          <a:lstStyle/>
+          <a:p>
+            <a:pPr algn="ctr"/>
+            <a:r>
+              <a:rPr lang="es-ES" dirty="0"/>
+              <a:t>Atacar</a:t>
+            </a:r>
+          </a:p>
+        </p:txBody>
+      </p:sp>
+      <p:cxnSp>
+        <p:nvCxnSpPr>
+          <p:cNvPr id="65" name="Conector recto de flecha 64">
+            <a:extLst>
+              <a:ext uri="{FF2B5EF4-FFF2-40B4-BE49-F238E27FC236}">
+                <a16:creationId xmlns:a16="http://schemas.microsoft.com/office/drawing/2014/main" id="{89C06588-796D-4A5B-BA8D-0E4B92FA222E}"/>
+              </a:ext>
+            </a:extLst>
+          </p:cNvPr>
+          <p:cNvCxnSpPr>
+            <a:stCxn id="36" idx="3"/>
+            <a:endCxn id="63" idx="1"/>
+          </p:cNvCxnSpPr>
+          <p:nvPr/>
+        </p:nvCxnSpPr>
+        <p:spPr>
+          <a:xfrm>
+            <a:off x="8717868" y="6243601"/>
+            <a:ext cx="1808075" cy="0"/>
+          </a:xfrm>
+          <a:prstGeom prst="straightConnector1">
+            <a:avLst/>
+          </a:prstGeom>
+          <a:ln>
+            <a:tailEnd type="triangle"/>
+          </a:ln>
+        </p:spPr>
+        <p:style>
+          <a:lnRef idx="1">
+            <a:schemeClr val="accent1"/>
+          </a:lnRef>
+          <a:fillRef idx="0">
+            <a:schemeClr val="accent1"/>
+          </a:fillRef>
+          <a:effectRef idx="0">
+            <a:schemeClr val="accent1"/>
+          </a:effectRef>
+          <a:fontRef idx="minor">
+            <a:schemeClr val="tx1"/>
+          </a:fontRef>
+        </p:style>
+      </p:cxnSp>
+      <p:sp>
+        <p:nvSpPr>
+          <p:cNvPr id="67" name="CuadroTexto 66">
+            <a:extLst>
+              <a:ext uri="{FF2B5EF4-FFF2-40B4-BE49-F238E27FC236}">
+                <a16:creationId xmlns:a16="http://schemas.microsoft.com/office/drawing/2014/main" id="{B4D0A3CF-5CE9-4149-B450-1818DC2C9198}"/>
+              </a:ext>
+            </a:extLst>
+          </p:cNvPr>
+          <p:cNvSpPr txBox="1"/>
+          <p:nvPr/>
+        </p:nvSpPr>
+        <p:spPr>
+          <a:xfrm>
+            <a:off x="8824395" y="5376581"/>
+            <a:ext cx="1518081" cy="646331"/>
+          </a:xfrm>
+          <a:prstGeom prst="rect">
+            <a:avLst/>
+          </a:prstGeom>
+          <a:noFill/>
+        </p:spPr>
+        <p:txBody>
+          <a:bodyPr wrap="square" rtlCol="0">
+            <a:spAutoFit/>
+          </a:bodyPr>
+          <a:lstStyle/>
+          <a:p>
+            <a:r>
+              <a:rPr lang="es-ES" dirty="0"/>
+              <a:t>Jugador en rango</a:t>
+            </a:r>
+          </a:p>
+        </p:txBody>
+      </p:sp>
+    </p:spTree>
+    <p:extLst>
+      <p:ext uri="{BB962C8B-B14F-4D97-AF65-F5344CB8AC3E}">
+        <p14:creationId xmlns:p14="http://schemas.microsoft.com/office/powerpoint/2010/main" val="1537144964"/>
+      </p:ext>
+    </p:extLst>
+  </p:cSld>
+  <p:clrMapOvr>
+    <a:masterClrMapping/>
+  </p:clrMapOvr>
+</p:sld>
+</file>
+
 <file path=ppt/theme/theme1.xml><?xml version="1.0" encoding="utf-8"?>
 <a:theme xmlns:a="http://schemas.openxmlformats.org/drawingml/2006/main" name="Tema de Office">
   <a:themeElements>

</xml_diff>